<commit_message>
updated exercises and lecture material
</commit_message>
<xml_diff>
--- a/slides/Assembly_Validation_3.pptx
+++ b/slides/Assembly_Validation_3.pptx
@@ -12536,11 +12536,52 @@
             </a:r>
           </a:p>
           <a:p>
+            <a:pPr marL="457200" lvl="1" indent="0">
+              <a:buNone/>
+            </a:pPr>
+            <a:endParaRPr lang="en-US" dirty="0" smtClean="0"/>
+          </a:p>
+          <a:p>
             <a:pPr lvl="1"/>
             <a:r>
               <a:rPr lang="en-US" dirty="0" smtClean="0"/>
-              <a:t>Complex if done well</a:t>
-            </a:r>
+              <a:t>Align de novo assembled transcripts</a:t>
+            </a:r>
+          </a:p>
+          <a:p>
+            <a:pPr lvl="2"/>
+            <a:r>
+              <a:rPr lang="en-US" dirty="0"/>
+              <a:t>E</a:t>
+            </a:r>
+            <a:r>
+              <a:rPr lang="en-US" dirty="0" smtClean="0"/>
+              <a:t>valuate transcripts (e.g. </a:t>
+            </a:r>
+            <a:r>
+              <a:rPr lang="en-US" dirty="0" err="1" smtClean="0"/>
+              <a:t>Transrate</a:t>
+            </a:r>
+            <a:r>
+              <a:rPr lang="en-US" dirty="0" smtClean="0"/>
+              <a:t>, Detonate)</a:t>
+            </a:r>
+          </a:p>
+          <a:p>
+            <a:pPr lvl="2"/>
+            <a:r>
+              <a:rPr lang="en-US" dirty="0" smtClean="0"/>
+              <a:t>Alignment statistics (e.g. </a:t>
+            </a:r>
+            <a:r>
+              <a:rPr lang="en-US" dirty="0" err="1" smtClean="0"/>
+              <a:t>gmap</a:t>
+            </a:r>
+            <a:r>
+              <a:rPr lang="en-US" dirty="0" smtClean="0"/>
+              <a:t>)</a:t>
+            </a:r>
+            <a:endParaRPr lang="en-US" dirty="0" smtClean="0"/>
           </a:p>
           <a:p>
             <a:pPr lvl="1"/>
@@ -12550,52 +12591,6 @@
             <a:pPr lvl="1"/>
             <a:r>
               <a:rPr lang="en-US" dirty="0" smtClean="0"/>
-              <a:t>Align de novo assembled transcripts</a:t>
-            </a:r>
-          </a:p>
-          <a:p>
-            <a:pPr lvl="2"/>
-            <a:r>
-              <a:rPr lang="en-US" dirty="0"/>
-              <a:t>E</a:t>
-            </a:r>
-            <a:r>
-              <a:rPr lang="en-US" dirty="0" smtClean="0"/>
-              <a:t>valuate transcripts (e.g. </a:t>
-            </a:r>
-            <a:r>
-              <a:rPr lang="en-US" dirty="0" err="1" smtClean="0"/>
-              <a:t>Transrate</a:t>
-            </a:r>
-            <a:r>
-              <a:rPr lang="en-US" dirty="0" smtClean="0"/>
-              <a:t>, Detonate)</a:t>
-            </a:r>
-          </a:p>
-          <a:p>
-            <a:pPr lvl="2"/>
-            <a:r>
-              <a:rPr lang="en-US" dirty="0" smtClean="0"/>
-              <a:t>Alignment statistics (e.g. </a:t>
-            </a:r>
-            <a:r>
-              <a:rPr lang="en-US" dirty="0" err="1" smtClean="0"/>
-              <a:t>gmap</a:t>
-            </a:r>
-            <a:r>
-              <a:rPr lang="en-US" dirty="0" smtClean="0"/>
-              <a:t>)</a:t>
-            </a:r>
-            <a:endParaRPr lang="en-US" dirty="0" smtClean="0"/>
-          </a:p>
-          <a:p>
-            <a:pPr lvl="1"/>
-            <a:endParaRPr lang="en-US" dirty="0" smtClean="0"/>
-          </a:p>
-          <a:p>
-            <a:pPr lvl="1"/>
-            <a:r>
-              <a:rPr lang="en-US" dirty="0" smtClean="0"/>
               <a:t>Align reads</a:t>
             </a:r>
           </a:p>
@@ -12646,7 +12641,7 @@
             </a:r>
             <a:r>
               <a:rPr lang="en-US" dirty="0" smtClean="0"/>
-              <a:t> is often a snapshot of time, tissue, treatment, etc.</a:t>
+              <a:t> is a snapshot of time, tissue, treatment, etc.</a:t>
             </a:r>
             <a:endParaRPr lang="en-US" dirty="0"/>
           </a:p>

</xml_diff>

<commit_message>
updated exercises and lectures
</commit_message>
<xml_diff>
--- a/slides/Assembly_Validation_3.pptx
+++ b/slides/Assembly_Validation_3.pptx
@@ -159,7 +159,7 @@
           <a:p>
             <a:fld id="{4B9720D4-D7AF-7847-888A-53A6BBEAF218}" type="datetimeFigureOut">
               <a:rPr lang="en-US" smtClean="0"/>
-              <a:t>18-11-12</a:t>
+              <a:t>18-11-18</a:t>
             </a:fld>
             <a:endParaRPr lang="en-US"/>
           </a:p>
@@ -548,7 +548,7 @@
           <a:p>
             <a:fld id="{4B9720D4-D7AF-7847-888A-53A6BBEAF218}" type="datetimeFigureOut">
               <a:rPr lang="en-US" smtClean="0"/>
-              <a:t>18-11-12</a:t>
+              <a:t>18-11-18</a:t>
             </a:fld>
             <a:endParaRPr lang="en-US"/>
           </a:p>
@@ -777,7 +777,7 @@
                 </a:solidFill>
               </a:rPr>
               <a:pPr/>
-              <a:t>18-11-12</a:t>
+              <a:t>18-11-18</a:t>
             </a:fld>
             <a:endParaRPr lang="sv-SE">
               <a:solidFill>
@@ -1016,7 +1016,7 @@
                 </a:solidFill>
               </a:rPr>
               <a:pPr/>
-              <a:t>18-11-12</a:t>
+              <a:t>18-11-18</a:t>
             </a:fld>
             <a:endParaRPr lang="sv-SE">
               <a:solidFill>
@@ -1462,7 +1462,7 @@
           <a:p>
             <a:fld id="{4B9720D4-D7AF-7847-888A-53A6BBEAF218}" type="datetimeFigureOut">
               <a:rPr lang="en-US" smtClean="0"/>
-              <a:t>18-11-12</a:t>
+              <a:t>18-11-18</a:t>
             </a:fld>
             <a:endParaRPr lang="en-US"/>
           </a:p>
@@ -1645,7 +1645,7 @@
           <a:p>
             <a:fld id="{4B9720D4-D7AF-7847-888A-53A6BBEAF218}" type="datetimeFigureOut">
               <a:rPr lang="en-US" smtClean="0"/>
-              <a:t>18-11-12</a:t>
+              <a:t>18-11-18</a:t>
             </a:fld>
             <a:endParaRPr lang="en-US"/>
           </a:p>
@@ -1940,7 +1940,7 @@
           <a:p>
             <a:fld id="{4B9720D4-D7AF-7847-888A-53A6BBEAF218}" type="datetimeFigureOut">
               <a:rPr lang="en-US" smtClean="0"/>
-              <a:t>18-11-12</a:t>
+              <a:t>18-11-18</a:t>
             </a:fld>
             <a:endParaRPr lang="en-US"/>
           </a:p>
@@ -2045,7 +2045,7 @@
                 </a:solidFill>
               </a:rPr>
               <a:pPr/>
-              <a:t>18-11-12</a:t>
+              <a:t>18-11-18</a:t>
             </a:fld>
             <a:endParaRPr lang="sv-SE" dirty="0">
               <a:solidFill>
@@ -2331,7 +2331,7 @@
           <a:p>
             <a:fld id="{4B9720D4-D7AF-7847-888A-53A6BBEAF218}" type="datetimeFigureOut">
               <a:rPr lang="en-US" smtClean="0"/>
-              <a:t>18-11-12</a:t>
+              <a:t>18-11-18</a:t>
             </a:fld>
             <a:endParaRPr lang="en-US"/>
           </a:p>
@@ -2618,7 +2618,7 @@
           <a:p>
             <a:fld id="{4B9720D4-D7AF-7847-888A-53A6BBEAF218}" type="datetimeFigureOut">
               <a:rPr lang="en-US" smtClean="0"/>
-              <a:t>18-11-12</a:t>
+              <a:t>18-11-18</a:t>
             </a:fld>
             <a:endParaRPr lang="en-US"/>
           </a:p>
@@ -2788,7 +2788,7 @@
           <a:p>
             <a:fld id="{4B9720D4-D7AF-7847-888A-53A6BBEAF218}" type="datetimeFigureOut">
               <a:rPr lang="en-US" smtClean="0"/>
-              <a:t>18-11-12</a:t>
+              <a:t>18-11-18</a:t>
             </a:fld>
             <a:endParaRPr lang="en-US"/>
           </a:p>
@@ -2908,7 +2908,7 @@
                 </a:solidFill>
               </a:rPr>
               <a:pPr/>
-              <a:t>18-11-12</a:t>
+              <a:t>18-11-18</a:t>
             </a:fld>
             <a:endParaRPr lang="sv-SE" dirty="0">
               <a:solidFill>
@@ -3159,7 +3159,7 @@
           <a:p>
             <a:fld id="{4B9720D4-D7AF-7847-888A-53A6BBEAF218}" type="datetimeFigureOut">
               <a:rPr lang="en-US" smtClean="0"/>
-              <a:t>18-11-12</a:t>
+              <a:t>18-11-18</a:t>
             </a:fld>
             <a:endParaRPr lang="en-US"/>
           </a:p>
@@ -3263,7 +3263,7 @@
             <a:fld id="{39D94CFA-45CE-584A-8B62-052D61CCBF25}" type="datetime1">
               <a:rPr lang="sv-SE" smtClean="0"/>
               <a:pPr/>
-              <a:t>18-11-12</a:t>
+              <a:t>18-11-18</a:t>
             </a:fld>
             <a:endParaRPr lang="sv-SE"/>
           </a:p>
@@ -3479,7 +3479,7 @@
             <a:fld id="{39D94CFA-45CE-584A-8B62-052D61CCBF25}" type="datetime1">
               <a:rPr lang="sv-SE" smtClean="0"/>
               <a:pPr/>
-              <a:t>18-11-12</a:t>
+              <a:t>18-11-18</a:t>
             </a:fld>
             <a:endParaRPr lang="sv-SE"/>
           </a:p>
@@ -3892,7 +3892,7 @@
                 </a:solidFill>
               </a:rPr>
               <a:pPr/>
-              <a:t>18-11-12</a:t>
+              <a:t>18-11-18</a:t>
             </a:fld>
             <a:endParaRPr lang="sv-SE">
               <a:solidFill>
@@ -4131,7 +4131,7 @@
                 </a:solidFill>
               </a:rPr>
               <a:pPr/>
-              <a:t>18-11-12</a:t>
+              <a:t>18-11-18</a:t>
             </a:fld>
             <a:endParaRPr lang="sv-SE">
               <a:solidFill>
@@ -4627,7 +4627,7 @@
           <a:p>
             <a:fld id="{4B9720D4-D7AF-7847-888A-53A6BBEAF218}" type="datetimeFigureOut">
               <a:rPr lang="en-US" smtClean="0"/>
-              <a:t>18-11-12</a:t>
+              <a:t>18-11-18</a:t>
             </a:fld>
             <a:endParaRPr lang="en-US"/>
           </a:p>
@@ -4740,7 +4740,7 @@
           <a:p>
             <a:fld id="{4B9720D4-D7AF-7847-888A-53A6BBEAF218}" type="datetimeFigureOut">
               <a:rPr lang="en-US" smtClean="0"/>
-              <a:t>18-11-12</a:t>
+              <a:t>18-11-18</a:t>
             </a:fld>
             <a:endParaRPr lang="en-US"/>
           </a:p>
@@ -4977,7 +4977,7 @@
           <a:p>
             <a:fld id="{4B9720D4-D7AF-7847-888A-53A6BBEAF218}" type="datetimeFigureOut">
               <a:rPr lang="en-US" smtClean="0"/>
-              <a:t>18-11-12</a:t>
+              <a:t>18-11-18</a:t>
             </a:fld>
             <a:endParaRPr lang="en-US"/>
           </a:p>
@@ -5073,7 +5073,7 @@
             <a:fld id="{39D94CFA-45CE-584A-8B62-052D61CCBF25}" type="datetime1">
               <a:rPr lang="sv-SE" smtClean="0"/>
               <a:pPr/>
-              <a:t>18-11-12</a:t>
+              <a:t>18-11-18</a:t>
             </a:fld>
             <a:endParaRPr lang="sv-SE"/>
           </a:p>
@@ -5289,7 +5289,7 @@
             <a:fld id="{39D94CFA-45CE-584A-8B62-052D61CCBF25}" type="datetime1">
               <a:rPr lang="sv-SE" smtClean="0"/>
               <a:pPr/>
-              <a:t>18-11-12</a:t>
+              <a:t>18-11-18</a:t>
             </a:fld>
             <a:endParaRPr lang="sv-SE"/>
           </a:p>
@@ -5718,7 +5718,7 @@
           <a:p>
             <a:fld id="{4B9720D4-D7AF-7847-888A-53A6BBEAF218}" type="datetimeFigureOut">
               <a:rPr lang="en-US" smtClean="0"/>
-              <a:t>18-11-12</a:t>
+              <a:t>18-11-18</a:t>
             </a:fld>
             <a:endParaRPr lang="en-US"/>
           </a:p>
@@ -5901,7 +5901,7 @@
           <a:p>
             <a:fld id="{4B9720D4-D7AF-7847-888A-53A6BBEAF218}" type="datetimeFigureOut">
               <a:rPr lang="en-US" smtClean="0"/>
-              <a:t>18-11-12</a:t>
+              <a:t>18-11-18</a:t>
             </a:fld>
             <a:endParaRPr lang="en-US"/>
           </a:p>
@@ -6122,7 +6122,7 @@
           <a:p>
             <a:fld id="{4B9720D4-D7AF-7847-888A-53A6BBEAF218}" type="datetimeFigureOut">
               <a:rPr lang="en-US" smtClean="0"/>
-              <a:t>18-11-12</a:t>
+              <a:t>18-11-18</a:t>
             </a:fld>
             <a:endParaRPr lang="en-US"/>
           </a:p>
@@ -6719,7 +6719,7 @@
             <a:fld id="{87D81263-415E-F842-A2D0-D498F08AEC56}" type="datetime1">
               <a:rPr lang="sv-SE" smtClean="0"/>
               <a:pPr/>
-              <a:t>18-11-12</a:t>
+              <a:t>18-11-18</a:t>
             </a:fld>
             <a:endParaRPr lang="sv-SE" dirty="0"/>
           </a:p>
@@ -7748,7 +7748,7 @@
                 </a:solidFill>
               </a:rPr>
               <a:pPr/>
-              <a:t>18-11-12</a:t>
+              <a:t>18-11-18</a:t>
             </a:fld>
             <a:endParaRPr lang="sv-SE" dirty="0">
               <a:solidFill>
@@ -8326,7 +8326,7 @@
           <a:p>
             <a:fld id="{4B9720D4-D7AF-7847-888A-53A6BBEAF218}" type="datetimeFigureOut">
               <a:rPr lang="en-US" smtClean="0"/>
-              <a:t>18-11-12</a:t>
+              <a:t>18-11-18</a:t>
             </a:fld>
             <a:endParaRPr lang="en-US"/>
           </a:p>
@@ -8923,7 +8923,7 @@
             <a:fld id="{87D81263-415E-F842-A2D0-D498F08AEC56}" type="datetime1">
               <a:rPr lang="sv-SE" smtClean="0"/>
               <a:pPr/>
-              <a:t>18-11-12</a:t>
+              <a:t>18-11-18</a:t>
             </a:fld>
             <a:endParaRPr lang="sv-SE" dirty="0"/>
           </a:p>
@@ -9949,7 +9949,7 @@
                 </a:solidFill>
               </a:rPr>
               <a:pPr/>
-              <a:t>18-11-12</a:t>
+              <a:t>18-11-18</a:t>
             </a:fld>
             <a:endParaRPr lang="sv-SE" dirty="0">
               <a:solidFill>
@@ -11043,13 +11043,6 @@
               </a:rPr>
               <a:t>(10X Genomics)</a:t>
             </a:r>
-            <a:endParaRPr lang="en-US" dirty="0" smtClean="0">
-              <a:solidFill>
-                <a:schemeClr val="bg1">
-                  <a:lumMod val="65000"/>
-                </a:schemeClr>
-              </a:solidFill>
-            </a:endParaRPr>
           </a:p>
           <a:p>
             <a:pPr lvl="1"/>
@@ -11139,11 +11132,6 @@
               </a:rPr>
               <a:t>)</a:t>
             </a:r>
-            <a:endParaRPr lang="en-US" dirty="0" smtClean="0">
-              <a:solidFill>
-                <a:srgbClr val="A6A6A6"/>
-              </a:solidFill>
-            </a:endParaRPr>
           </a:p>
           <a:p>
             <a:pPr lvl="1"/>
@@ -11258,10 +11246,6 @@
           </a:p>
           <a:p>
             <a:pPr lvl="1"/>
-            <a:r>
-              <a:rPr lang="en-US" dirty="0" err="1" smtClean="0"/>
-              <a:t>TigMint</a:t>
-            </a:r>
             <a:endParaRPr lang="en-US" dirty="0" smtClean="0"/>
           </a:p>
           <a:p>
@@ -12581,7 +12565,6 @@
               <a:rPr lang="en-US" dirty="0" smtClean="0"/>
               <a:t>)</a:t>
             </a:r>
-            <a:endParaRPr lang="en-US" dirty="0" smtClean="0"/>
           </a:p>
           <a:p>
             <a:pPr lvl="1"/>
@@ -12649,11 +12632,7 @@
             <a:pPr lvl="2"/>
             <a:r>
               <a:rPr lang="en-US" dirty="0" smtClean="0"/>
-              <a:t>Is your</a:t>
-            </a:r>
-            <a:r>
-              <a:rPr lang="en-US" dirty="0" smtClean="0"/>
-              <a:t> RNA </a:t>
+              <a:t>Is your RNA </a:t>
             </a:r>
             <a:r>
               <a:rPr lang="en-US" dirty="0" err="1" smtClean="0"/>

</xml_diff>